<commit_message>
updating the defence correction
</commit_message>
<xml_diff>
--- a/FYP Poster Arjan.pptx
+++ b/FYP Poster Arjan.pptx
@@ -3668,7 +3668,7 @@
                 <a:latin typeface="Calibri" pitchFamily="34" charset="0"/>
                 <a:cs typeface="Calibri" pitchFamily="34" charset="0"/>
               </a:rPr>
-              <a:t>TeamCode: An Interactive Web Application to Learn Coding Online with Real-Time Data Exchange</a:t>
+              <a:t>An Interactive Web Application to Learn Coding Online with Real-Time Data Exchange</a:t>
             </a:r>
             <a:endParaRPr lang="en-US" sz="9600" b="1" dirty="0">
               <a:solidFill>
@@ -4656,6 +4656,43 @@
                           <a:ea typeface="+mn-ea"/>
                           <a:cs typeface="+mn-cs"/>
                         </a:rPr>
+                        <a:t>To create an interface to write and modify code using Monaco editor.</a:t>
+                      </a:r>
+                      <a:endParaRPr lang="en-MY" sz="2000" b="1" kern="1200" baseline="0" dirty="0">
+                        <a:solidFill>
+                          <a:schemeClr val="tx1"/>
+                        </a:solidFill>
+                        <a:latin typeface="+mn-lt"/>
+                        <a:ea typeface="+mn-ea"/>
+                        <a:cs typeface="+mn-cs"/>
+                      </a:endParaRPr>
+                    </a:p>
+                    <a:p>
+                      <a:pPr marL="342900" marR="0" indent="-342900" algn="just" defTabSz="4174490" rtl="0" eaLnBrk="1" fontAlgn="auto" latinLnBrk="0" hangingPunct="1">
+                        <a:lnSpc>
+                          <a:spcPct val="110000"/>
+                        </a:lnSpc>
+                        <a:spcBef>
+                          <a:spcPts val="0"/>
+                        </a:spcBef>
+                        <a:spcAft>
+                          <a:spcPts val="0"/>
+                        </a:spcAft>
+                        <a:buClrTx/>
+                        <a:buSzTx/>
+                        <a:buFont typeface="Arial" panose="020B0604020202020204" pitchFamily="34" charset="0"/>
+                        <a:buChar char="•"/>
+                        <a:defRPr/>
+                      </a:pPr>
+                      <a:r>
+                        <a:rPr lang="en-MY" sz="2000" b="1" kern="1200" baseline="0" dirty="0">
+                          <a:solidFill>
+                            <a:schemeClr val="tx1"/>
+                          </a:solidFill>
+                          <a:latin typeface="+mn-lt"/>
+                          <a:ea typeface="+mn-ea"/>
+                          <a:cs typeface="+mn-cs"/>
+                        </a:rPr>
                         <a:t>To execute the written code with Judge0 API (Application Programming Interface) and display the output. </a:t>
                       </a:r>
                       <a:endParaRPr lang="en-MY" sz="2000" b="1" kern="1200" baseline="0" dirty="0">
@@ -4730,7 +4767,7 @@
                           <a:ea typeface="+mn-ea"/>
                           <a:cs typeface="+mn-cs"/>
                         </a:rPr>
-                        <a:t>To include diverse control options within the system. </a:t>
+                        <a:t>To include diverse control options like can edit and can view within the system. </a:t>
                       </a:r>
                       <a:endParaRPr lang="en-MY" sz="2000" b="1" kern="1200" baseline="0" dirty="0">
                         <a:solidFill>
@@ -4807,6 +4844,17 @@
                         </a:rPr>
                         <a:t>Scope of Work</a:t>
                       </a:r>
+                      <a:endParaRPr lang="en-MY" sz="3200" b="1" u="sng" kern="1200" baseline="0" dirty="0">
+                        <a:solidFill>
+                          <a:schemeClr val="tx1"/>
+                        </a:solidFill>
+                        <a:latin typeface="+mn-lt"/>
+                        <a:ea typeface="+mn-ea"/>
+                        <a:cs typeface="+mn-cs"/>
+                      </a:endParaRPr>
+                    </a:p>
+                    <a:p>
+                      <a:pPr marL="0" algn="ctr" defTabSz="4174490" rtl="0" eaLnBrk="1" latinLnBrk="0" hangingPunct="1"/>
                       <a:endParaRPr lang="en-MY" sz="3200" b="1" u="sng" kern="1200" baseline="0" dirty="0">
                         <a:solidFill>
                           <a:schemeClr val="tx1"/>
@@ -6988,7 +7036,7 @@
       </p:pic>
       <p:pic>
         <p:nvPicPr>
-          <p:cNvPr id="8" name="Picture 7"/>
+          <p:cNvPr id="19" name="Picture 18" descr="Teamcode-1"/>
           <p:cNvPicPr>
             <a:picLocks noChangeAspect="1"/>
           </p:cNvPicPr>
@@ -6996,54 +7044,6 @@
         </p:nvPicPr>
         <p:blipFill>
           <a:blip r:embed="rId4"/>
-          <a:stretch>
-            <a:fillRect/>
-          </a:stretch>
-        </p:blipFill>
-        <p:spPr>
-          <a:xfrm>
-            <a:off x="13004165" y="20411440"/>
-            <a:ext cx="4752975" cy="3990975"/>
-          </a:xfrm>
-          <a:prstGeom prst="rect">
-            <a:avLst/>
-          </a:prstGeom>
-        </p:spPr>
-      </p:pic>
-      <p:pic>
-        <p:nvPicPr>
-          <p:cNvPr id="17" name="Picture 16"/>
-          <p:cNvPicPr>
-            <a:picLocks noChangeAspect="1"/>
-          </p:cNvPicPr>
-          <p:nvPr/>
-        </p:nvPicPr>
-        <p:blipFill>
-          <a:blip r:embed="rId5"/>
-          <a:stretch>
-            <a:fillRect/>
-          </a:stretch>
-        </p:blipFill>
-        <p:spPr>
-          <a:xfrm>
-            <a:off x="21767165" y="14315440"/>
-            <a:ext cx="7159625" cy="3985260"/>
-          </a:xfrm>
-          <a:prstGeom prst="rect">
-            <a:avLst/>
-          </a:prstGeom>
-        </p:spPr>
-      </p:pic>
-      <p:pic>
-        <p:nvPicPr>
-          <p:cNvPr id="19" name="Picture 18" descr="Teamcode-1"/>
-          <p:cNvPicPr>
-            <a:picLocks noChangeAspect="1"/>
-          </p:cNvPicPr>
-          <p:nvPr/>
-        </p:nvPicPr>
-        <p:blipFill>
-          <a:blip r:embed="rId6"/>
           <a:srcRect t="3928" r="35" b="951"/>
           <a:stretch>
             <a:fillRect/>
@@ -7068,7 +7068,7 @@
           <p:nvPr/>
         </p:nvPicPr>
         <p:blipFill>
-          <a:blip r:embed="rId7"/>
+          <a:blip r:embed="rId5"/>
           <a:stretch>
             <a:fillRect/>
           </a:stretch>
@@ -7077,6 +7077,54 @@
           <a:xfrm>
             <a:off x="25119965" y="20411440"/>
             <a:ext cx="4838700" cy="6648450"/>
+          </a:xfrm>
+          <a:prstGeom prst="rect">
+            <a:avLst/>
+          </a:prstGeom>
+        </p:spPr>
+      </p:pic>
+      <p:pic>
+        <p:nvPicPr>
+          <p:cNvPr id="18" name="Picture 17" descr="team-code-use-case"/>
+          <p:cNvPicPr>
+            <a:picLocks noChangeAspect="1"/>
+          </p:cNvPicPr>
+          <p:nvPr/>
+        </p:nvPicPr>
+        <p:blipFill>
+          <a:blip r:embed="rId6"/>
+          <a:stretch>
+            <a:fillRect/>
+          </a:stretch>
+        </p:blipFill>
+        <p:spPr>
+          <a:xfrm>
+            <a:off x="12017375" y="20411440"/>
+            <a:ext cx="6470015" cy="4142105"/>
+          </a:xfrm>
+          <a:prstGeom prst="rect">
+            <a:avLst/>
+          </a:prstGeom>
+        </p:spPr>
+      </p:pic>
+      <p:pic>
+        <p:nvPicPr>
+          <p:cNvPr id="21" name="Picture 20"/>
+          <p:cNvPicPr>
+            <a:picLocks noChangeAspect="1"/>
+          </p:cNvPicPr>
+          <p:nvPr/>
+        </p:nvPicPr>
+        <p:blipFill>
+          <a:blip r:embed="rId7"/>
+          <a:stretch>
+            <a:fillRect/>
+          </a:stretch>
+        </p:blipFill>
+        <p:spPr>
+          <a:xfrm>
+            <a:off x="21614765" y="14925040"/>
+            <a:ext cx="6762750" cy="3590925"/>
           </a:xfrm>
           <a:prstGeom prst="rect">
             <a:avLst/>

</xml_diff>

<commit_message>
finishing report chap 4, 5, 6
</commit_message>
<xml_diff>
--- a/FYP Poster Arjan.pptx
+++ b/FYP Poster Arjan.pptx
@@ -3246,7 +3246,7 @@
         <a:spcBef>
           <a:spcPct val="20000"/>
         </a:spcBef>
-        <a:buFont typeface="Arial" panose="020B0604020202020204" pitchFamily="34" charset="0"/>
+        <a:buFont typeface="Arial" panose="02080604020202020204" pitchFamily="34" charset="0"/>
         <a:buChar char="•"/>
         <a:defRPr sz="14565" kern="1200">
           <a:solidFill>
@@ -3261,7 +3261,7 @@
         <a:spcBef>
           <a:spcPct val="20000"/>
         </a:spcBef>
-        <a:buFont typeface="Arial" panose="020B0604020202020204" pitchFamily="34" charset="0"/>
+        <a:buFont typeface="Arial" panose="02080604020202020204" pitchFamily="34" charset="0"/>
         <a:buChar char="–"/>
         <a:defRPr sz="12730" kern="1200">
           <a:solidFill>
@@ -3276,7 +3276,7 @@
         <a:spcBef>
           <a:spcPct val="20000"/>
         </a:spcBef>
-        <a:buFont typeface="Arial" panose="020B0604020202020204" pitchFamily="34" charset="0"/>
+        <a:buFont typeface="Arial" panose="02080604020202020204" pitchFamily="34" charset="0"/>
         <a:buChar char="•"/>
         <a:defRPr sz="11030" kern="1200">
           <a:solidFill>
@@ -3291,7 +3291,7 @@
         <a:spcBef>
           <a:spcPct val="20000"/>
         </a:spcBef>
-        <a:buFont typeface="Arial" panose="020B0604020202020204" pitchFamily="34" charset="0"/>
+        <a:buFont typeface="Arial" panose="02080604020202020204" pitchFamily="34" charset="0"/>
         <a:buChar char="–"/>
         <a:defRPr sz="9050" kern="1200">
           <a:solidFill>
@@ -3306,7 +3306,7 @@
         <a:spcBef>
           <a:spcPct val="20000"/>
         </a:spcBef>
-        <a:buFont typeface="Arial" panose="020B0604020202020204" pitchFamily="34" charset="0"/>
+        <a:buFont typeface="Arial" panose="02080604020202020204" pitchFamily="34" charset="0"/>
         <a:buChar char="»"/>
         <a:defRPr sz="9050" kern="1200">
           <a:solidFill>
@@ -3321,7 +3321,7 @@
         <a:spcBef>
           <a:spcPct val="20000"/>
         </a:spcBef>
-        <a:buFont typeface="Arial" panose="020B0604020202020204" pitchFamily="34" charset="0"/>
+        <a:buFont typeface="Arial" panose="02080604020202020204" pitchFamily="34" charset="0"/>
         <a:buChar char="•"/>
         <a:defRPr sz="9050" kern="1200">
           <a:solidFill>
@@ -3336,7 +3336,7 @@
         <a:spcBef>
           <a:spcPct val="20000"/>
         </a:spcBef>
-        <a:buFont typeface="Arial" panose="020B0604020202020204" pitchFamily="34" charset="0"/>
+        <a:buFont typeface="Arial" panose="02080604020202020204" pitchFamily="34" charset="0"/>
         <a:buChar char="•"/>
         <a:defRPr sz="9050" kern="1200">
           <a:solidFill>
@@ -3351,7 +3351,7 @@
         <a:spcBef>
           <a:spcPct val="20000"/>
         </a:spcBef>
-        <a:buFont typeface="Arial" panose="020B0604020202020204" pitchFamily="34" charset="0"/>
+        <a:buFont typeface="Arial" panose="02080604020202020204" pitchFamily="34" charset="0"/>
         <a:buChar char="•"/>
         <a:defRPr sz="9050" kern="1200">
           <a:solidFill>
@@ -3366,7 +3366,7 @@
         <a:spcBef>
           <a:spcPct val="20000"/>
         </a:spcBef>
-        <a:buFont typeface="Arial" panose="020B0604020202020204" pitchFamily="34" charset="0"/>
+        <a:buFont typeface="Arial" panose="02080604020202020204" pitchFamily="34" charset="0"/>
         <a:buChar char="•"/>
         <a:defRPr sz="9050" kern="1200">
           <a:solidFill>
@@ -3535,7 +3535,7 @@
             <a:pPr algn="ctr"/>
             <a:r>
               <a:rPr lang="en-US" sz="5400" dirty="0"/>
-              <a:t>FEB 2022 – FYP POSTER                                                                                                 IUKL                        </a:t>
+              <a:t>SEPT 2022 – FYP POSTER                                                                                                 IUKL                        </a:t>
             </a:r>
             <a:endParaRPr lang="en-US" sz="5400" dirty="0"/>
           </a:p>
@@ -3661,7 +3661,7 @@
           <a:p>
             <a:pPr algn="ctr"/>
             <a:r>
-              <a:rPr lang="en-US" sz="9600" b="1" dirty="0">
+              <a:rPr lang="en-US" sz="8800" b="1" dirty="0">
                 <a:solidFill>
                   <a:schemeClr val="bg1"/>
                 </a:solidFill>
@@ -3670,7 +3670,7 @@
               </a:rPr>
               <a:t>An Interactive Web Application to Learn Coding Online with Real-Time Data Exchange</a:t>
             </a:r>
-            <a:endParaRPr lang="en-US" sz="9600" b="1" dirty="0">
+            <a:endParaRPr lang="en-US" sz="8800" b="1" dirty="0">
               <a:solidFill>
                 <a:schemeClr val="bg1"/>
               </a:solidFill>
@@ -3947,7 +3947,7 @@
                         </a:spcAft>
                         <a:buClrTx/>
                         <a:buSzTx/>
-                        <a:buFont typeface="Arial" panose="020B0604020202020204" pitchFamily="34" charset="0"/>
+                        <a:buFont typeface="Arial" panose="02080604020202020204" pitchFamily="34" charset="0"/>
                         <a:buChar char="•"/>
                         <a:defRPr/>
                       </a:pPr>
@@ -4006,7 +4006,7 @@
                         </a:spcAft>
                         <a:buClrTx/>
                         <a:buSzTx/>
-                        <a:buFont typeface="Arial" panose="020B0604020202020204" pitchFamily="34" charset="0"/>
+                        <a:buFont typeface="Arial" panose="02080604020202020204" pitchFamily="34" charset="0"/>
                         <a:buChar char="•"/>
                         <a:defRPr/>
                       </a:pPr>
@@ -4043,7 +4043,7 @@
                         </a:spcAft>
                         <a:buClrTx/>
                         <a:buSzTx/>
-                        <a:buFont typeface="Arial" panose="020B0604020202020204" pitchFamily="34" charset="0"/>
+                        <a:buFont typeface="Arial" panose="02080604020202020204" pitchFamily="34" charset="0"/>
                         <a:buChar char="•"/>
                         <a:defRPr/>
                       </a:pPr>
@@ -4080,7 +4080,7 @@
                         </a:spcAft>
                         <a:buClrTx/>
                         <a:buSzTx/>
-                        <a:buFont typeface="Arial" panose="020B0604020202020204" pitchFamily="34" charset="0"/>
+                        <a:buFont typeface="Arial" panose="02080604020202020204" pitchFamily="34" charset="0"/>
                         <a:buChar char="•"/>
                         <a:defRPr/>
                       </a:pPr>
@@ -4254,7 +4254,7 @@
                         </a:spcAft>
                         <a:buClrTx/>
                         <a:buSzTx/>
-                        <a:buFont typeface="Arial" panose="020B0604020202020204" pitchFamily="34" charset="0"/>
+                        <a:buFont typeface="Arial" panose="02080604020202020204" pitchFamily="34" charset="0"/>
                         <a:buChar char="•"/>
                         <a:defRPr/>
                       </a:pPr>
@@ -4267,7 +4267,29 @@
                           <a:ea typeface="+mn-ea"/>
                           <a:cs typeface="+mn-cs"/>
                         </a:rPr>
-                        <a:t>Existing applications used to learn to code online provide fewer features for real-time editing of code. </a:t>
+                        <a:t>Meeting applications often used for distance learning like Zoom and Teams have</a:t>
+                      </a:r>
+                      <a:r>
+                        <a:rPr lang="en-US" altLang="en-MY" sz="2000" b="1" kern="1200" baseline="0" dirty="0">
+                          <a:solidFill>
+                            <a:schemeClr val="tx1"/>
+                          </a:solidFill>
+                          <a:latin typeface="+mn-lt"/>
+                          <a:ea typeface="+mn-ea"/>
+                          <a:cs typeface="+mn-cs"/>
+                        </a:rPr>
+                        <a:t> </a:t>
+                      </a:r>
+                      <a:r>
+                        <a:rPr lang="en-MY" sz="2000" b="1" kern="1200" baseline="0" dirty="0">
+                          <a:solidFill>
+                            <a:schemeClr val="tx1"/>
+                          </a:solidFill>
+                          <a:latin typeface="+mn-lt"/>
+                          <a:ea typeface="+mn-ea"/>
+                          <a:cs typeface="+mn-cs"/>
+                        </a:rPr>
+                        <a:t>proven to show inefficient results for online coding lectures.</a:t>
                       </a:r>
                       <a:endParaRPr lang="en-MY" sz="2000" b="1" kern="1200" baseline="0" dirty="0">
                         <a:solidFill>
@@ -4291,7 +4313,7 @@
                         </a:spcAft>
                         <a:buClrTx/>
                         <a:buSzTx/>
-                        <a:buFont typeface="Arial" panose="020B0604020202020204" pitchFamily="34" charset="0"/>
+                        <a:buFont typeface="Arial" panose="02080604020202020204" pitchFamily="34" charset="0"/>
                         <a:buChar char="•"/>
                         <a:defRPr/>
                       </a:pPr>
@@ -4304,7 +4326,29 @@
                           <a:ea typeface="+mn-ea"/>
                           <a:cs typeface="+mn-cs"/>
                         </a:rPr>
-                        <a:t>Existing applications have fewer models for users to pass on notifications to their instructors by highlighting the point at which they encounter anomalies in their code.</a:t>
+                        <a:t>Meeting applications provide less features for learning to code online like built-in</a:t>
+                      </a:r>
+                      <a:r>
+                        <a:rPr lang="en-US" altLang="en-MY" sz="2000" b="1" kern="1200" baseline="0" dirty="0">
+                          <a:solidFill>
+                            <a:schemeClr val="tx1"/>
+                          </a:solidFill>
+                          <a:latin typeface="+mn-lt"/>
+                          <a:ea typeface="+mn-ea"/>
+                          <a:cs typeface="+mn-cs"/>
+                        </a:rPr>
+                        <a:t> </a:t>
+                      </a:r>
+                      <a:r>
+                        <a:rPr lang="en-MY" sz="2000" b="1" kern="1200" baseline="0" dirty="0">
+                          <a:solidFill>
+                            <a:schemeClr val="tx1"/>
+                          </a:solidFill>
+                          <a:latin typeface="+mn-lt"/>
+                          <a:ea typeface="+mn-ea"/>
+                          <a:cs typeface="+mn-cs"/>
+                        </a:rPr>
+                        <a:t>text editor.</a:t>
                       </a:r>
                       <a:endParaRPr lang="en-MY" sz="2000" b="1" kern="1200" baseline="0" dirty="0">
                         <a:solidFill>
@@ -4328,7 +4372,7 @@
                         </a:spcAft>
                         <a:buClrTx/>
                         <a:buSzTx/>
-                        <a:buFont typeface="Arial" panose="020B0604020202020204" pitchFamily="34" charset="0"/>
+                        <a:buFont typeface="Arial" panose="02080604020202020204" pitchFamily="34" charset="0"/>
                         <a:buChar char="•"/>
                         <a:defRPr/>
                       </a:pPr>
@@ -4341,7 +4385,29 @@
                           <a:ea typeface="+mn-ea"/>
                           <a:cs typeface="+mn-cs"/>
                         </a:rPr>
-                        <a:t>Existing applications require users to install and configure necessary software before they can learn to code online. </a:t>
+                        <a:t>Online coding platforms like Hacker Rank and Coding Bat provide less features for</a:t>
+                      </a:r>
+                      <a:r>
+                        <a:rPr lang="en-US" altLang="en-MY" sz="2000" b="1" kern="1200" baseline="0" dirty="0">
+                          <a:solidFill>
+                            <a:schemeClr val="tx1"/>
+                          </a:solidFill>
+                          <a:latin typeface="+mn-lt"/>
+                          <a:ea typeface="+mn-ea"/>
+                          <a:cs typeface="+mn-cs"/>
+                        </a:rPr>
+                        <a:t> </a:t>
+                      </a:r>
+                      <a:r>
+                        <a:rPr lang="en-MY" sz="2000" b="1" kern="1200" baseline="0" dirty="0">
+                          <a:solidFill>
+                            <a:schemeClr val="tx1"/>
+                          </a:solidFill>
+                          <a:latin typeface="+mn-lt"/>
+                          <a:ea typeface="+mn-ea"/>
+                          <a:cs typeface="+mn-cs"/>
+                        </a:rPr>
+                        <a:t>real-time code editing.</a:t>
                       </a:r>
                       <a:endParaRPr lang="en-MY" sz="2000" b="1" kern="1200" baseline="0" dirty="0">
                         <a:solidFill>
@@ -4365,7 +4431,7 @@
                         </a:spcAft>
                         <a:buClrTx/>
                         <a:buSzTx/>
-                        <a:buFont typeface="Arial" panose="020B0604020202020204" pitchFamily="34" charset="0"/>
+                        <a:buFont typeface="Arial" panose="02080604020202020204" pitchFamily="34" charset="0"/>
                         <a:buChar char="•"/>
                         <a:defRPr/>
                       </a:pPr>
@@ -4378,7 +4444,88 @@
                           <a:ea typeface="+mn-ea"/>
                           <a:cs typeface="+mn-cs"/>
                         </a:rPr>
-                        <a:t>Fewer systems have diverse accessibility control options such as view only and can edit.  </a:t>
+                        <a:t>Existing applications require users to install and configure necessary software</a:t>
+                      </a:r>
+                      <a:r>
+                        <a:rPr lang="en-US" altLang="en-MY" sz="2000" b="1" kern="1200" baseline="0" dirty="0">
+                          <a:solidFill>
+                            <a:schemeClr val="tx1"/>
+                          </a:solidFill>
+                          <a:latin typeface="+mn-lt"/>
+                          <a:ea typeface="+mn-ea"/>
+                          <a:cs typeface="+mn-cs"/>
+                        </a:rPr>
+                        <a:t> </a:t>
+                      </a:r>
+                      <a:r>
+                        <a:rPr lang="en-MY" sz="2000" b="1" kern="1200" baseline="0" dirty="0">
+                          <a:solidFill>
+                            <a:schemeClr val="tx1"/>
+                          </a:solidFill>
+                          <a:latin typeface="+mn-lt"/>
+                          <a:ea typeface="+mn-ea"/>
+                          <a:cs typeface="+mn-cs"/>
+                        </a:rPr>
+                        <a:t>before they can learn to code online.</a:t>
+                      </a:r>
+                      <a:endParaRPr lang="en-MY" sz="2000" b="1" kern="1200" baseline="0" dirty="0">
+                        <a:solidFill>
+                          <a:schemeClr val="tx1"/>
+                        </a:solidFill>
+                        <a:latin typeface="+mn-lt"/>
+                        <a:ea typeface="+mn-ea"/>
+                        <a:cs typeface="+mn-cs"/>
+                      </a:endParaRPr>
+                    </a:p>
+                    <a:p>
+                      <a:pPr marL="342900" marR="0" indent="-342900" algn="just" defTabSz="4174490" rtl="0" eaLnBrk="1" fontAlgn="auto" latinLnBrk="0" hangingPunct="1">
+                        <a:lnSpc>
+                          <a:spcPct val="120000"/>
+                        </a:lnSpc>
+                        <a:spcBef>
+                          <a:spcPts val="0"/>
+                        </a:spcBef>
+                        <a:spcAft>
+                          <a:spcPts val="0"/>
+                        </a:spcAft>
+                        <a:buClrTx/>
+                        <a:buSzTx/>
+                        <a:buFont typeface="Arial" panose="02080604020202020204" pitchFamily="34" charset="0"/>
+                        <a:buChar char="•"/>
+                        <a:defRPr/>
+                      </a:pPr>
+                      <a:r>
+                        <a:rPr lang="en-MY" sz="2000" b="1" kern="1200" baseline="0" dirty="0">
+                          <a:solidFill>
+                            <a:schemeClr val="tx1"/>
+                          </a:solidFill>
+                          <a:latin typeface="+mn-lt"/>
+                          <a:ea typeface="+mn-ea"/>
+                          <a:cs typeface="+mn-cs"/>
+                        </a:rPr>
+                        <a:t>Fewer systems have diverse accessibility control options such as view only and can</a:t>
+                      </a:r>
+                      <a:r>
+                        <a:rPr lang="en-US" altLang="en-MY" sz="2000" b="1" kern="1200" baseline="0" dirty="0">
+                          <a:solidFill>
+                            <a:schemeClr val="tx1"/>
+                          </a:solidFill>
+                          <a:latin typeface="+mn-lt"/>
+                          <a:ea typeface="+mn-ea"/>
+                          <a:cs typeface="+mn-cs"/>
+                        </a:rPr>
+                        <a:t> </a:t>
+                      </a:r>
+                      <a:r>
+                        <a:rPr lang="en-MY" sz="2000" b="1" kern="1200" baseline="0" dirty="0">
+                          <a:solidFill>
+                            <a:schemeClr val="tx1"/>
+                          </a:solidFill>
+                          <a:latin typeface="+mn-lt"/>
+                          <a:ea typeface="+mn-ea"/>
+                          <a:cs typeface="+mn-cs"/>
+                        </a:rPr>
+                        <a:t>edit.</a:t>
                       </a:r>
                       <a:endParaRPr lang="en-MY" sz="2000" b="1" kern="1200" baseline="0" dirty="0">
                         <a:solidFill>
@@ -4495,7 +4642,7 @@
                         </a:spcAft>
                         <a:buClrTx/>
                         <a:buSzTx/>
-                        <a:buFont typeface="Arial" panose="020B0604020202020204" pitchFamily="34" charset="0"/>
+                        <a:buFont typeface="Arial" panose="02080604020202020204" pitchFamily="34" charset="0"/>
                         <a:buChar char="•"/>
                         <a:defRPr/>
                       </a:pPr>
@@ -4508,7 +4655,7 @@
                           <a:ea typeface="+mn-ea"/>
                           <a:cs typeface="+mn-cs"/>
                         </a:rPr>
-                        <a:t>To create a real-time application using WebRTC and Websockets.</a:t>
+                        <a:t>To create a real-time meeting web application for learning to code online.</a:t>
                       </a:r>
                       <a:endParaRPr lang="en-MY" sz="2000" b="1" kern="1200" baseline="0" dirty="0">
                         <a:solidFill>
@@ -4532,7 +4679,7 @@
                         </a:spcAft>
                         <a:buClrTx/>
                         <a:buSzTx/>
-                        <a:buFont typeface="Arial" panose="020B0604020202020204" pitchFamily="34" charset="0"/>
+                        <a:buFont typeface="Arial" panose="02080604020202020204" pitchFamily="34" charset="0"/>
                         <a:buChar char="•"/>
                         <a:defRPr/>
                       </a:pPr>
@@ -4545,7 +4692,7 @@
                           <a:ea typeface="+mn-ea"/>
                           <a:cs typeface="+mn-cs"/>
                         </a:rPr>
-                        <a:t>To provide the feature of real-time editing that an instructor can access to solve a learner's problem.</a:t>
+                        <a:t>To create an interface to write, modify and execute code.</a:t>
                       </a:r>
                       <a:endParaRPr lang="en-MY" sz="2000" b="1" kern="1200" baseline="0" dirty="0">
                         <a:solidFill>
@@ -4569,7 +4716,7 @@
                         </a:spcAft>
                         <a:buClrTx/>
                         <a:buSzTx/>
-                        <a:buFont typeface="Arial" panose="020B0604020202020204" pitchFamily="34" charset="0"/>
+                        <a:buFont typeface="Arial" panose="02080604020202020204" pitchFamily="34" charset="0"/>
                         <a:buChar char="•"/>
                         <a:defRPr/>
                       </a:pPr>
@@ -4582,7 +4729,29 @@
                           <a:ea typeface="+mn-ea"/>
                           <a:cs typeface="+mn-cs"/>
                         </a:rPr>
-                        <a:t>To make use of flags with the help of which learners can notify any problem.</a:t>
+                        <a:t>To provide a platform for learning to code without having the need to set up and</a:t>
+                      </a:r>
+                      <a:r>
+                        <a:rPr lang="en-US" altLang="en-MY" sz="2000" b="1" kern="1200" baseline="0" dirty="0">
+                          <a:solidFill>
+                            <a:schemeClr val="tx1"/>
+                          </a:solidFill>
+                          <a:latin typeface="+mn-lt"/>
+                          <a:ea typeface="+mn-ea"/>
+                          <a:cs typeface="+mn-cs"/>
+                        </a:rPr>
+                        <a:t> </a:t>
+                      </a:r>
+                      <a:r>
+                        <a:rPr lang="en-MY" sz="2000" b="1" kern="1200" baseline="0" dirty="0">
+                          <a:solidFill>
+                            <a:schemeClr val="tx1"/>
+                          </a:solidFill>
+                          <a:latin typeface="+mn-lt"/>
+                          <a:ea typeface="+mn-ea"/>
+                          <a:cs typeface="+mn-cs"/>
+                        </a:rPr>
+                        <a:t>configure programming environments.</a:t>
                       </a:r>
                       <a:endParaRPr lang="en-MY" sz="2000" b="1" kern="1200" baseline="0" dirty="0">
                         <a:solidFill>
@@ -4606,7 +4775,7 @@
                         </a:spcAft>
                         <a:buClrTx/>
                         <a:buSzTx/>
-                        <a:buFont typeface="Arial" panose="020B0604020202020204" pitchFamily="34" charset="0"/>
+                        <a:buFont typeface="Arial" panose="02080604020202020204" pitchFamily="34" charset="0"/>
                         <a:buChar char="•"/>
                         <a:defRPr/>
                       </a:pPr>
@@ -4619,7 +4788,7 @@
                           <a:ea typeface="+mn-ea"/>
                           <a:cs typeface="+mn-cs"/>
                         </a:rPr>
-                        <a:t>To provide a platform for learning to code without having the need to set up and configure programming environments.</a:t>
+                        <a:t>To include diverse control options like can edit and can view within the system.</a:t>
                       </a:r>
                       <a:endParaRPr lang="en-MY" sz="2000" b="1" kern="1200" baseline="0" dirty="0">
                         <a:solidFill>
@@ -4643,7 +4812,7 @@
                         </a:spcAft>
                         <a:buClrTx/>
                         <a:buSzTx/>
-                        <a:buFont typeface="Arial" panose="020B0604020202020204" pitchFamily="34" charset="0"/>
+                        <a:buFont typeface="Arial" panose="02080604020202020204" pitchFamily="34" charset="0"/>
                         <a:buChar char="•"/>
                         <a:defRPr/>
                       </a:pPr>
@@ -4656,7 +4825,29 @@
                           <a:ea typeface="+mn-ea"/>
                           <a:cs typeface="+mn-cs"/>
                         </a:rPr>
-                        <a:t>To create an interface to write and modify code using Monaco editor.</a:t>
+                        <a:t>To develop a web application with notification functionality such that learners can</a:t>
+                      </a:r>
+                      <a:r>
+                        <a:rPr lang="en-US" altLang="en-MY" sz="2000" b="1" kern="1200" baseline="0" dirty="0">
+                          <a:solidFill>
+                            <a:schemeClr val="tx1"/>
+                          </a:solidFill>
+                          <a:latin typeface="+mn-lt"/>
+                          <a:ea typeface="+mn-ea"/>
+                          <a:cs typeface="+mn-cs"/>
+                        </a:rPr>
+                        <a:t> </a:t>
+                      </a:r>
+                      <a:r>
+                        <a:rPr lang="en-MY" sz="2000" b="1" kern="1200" baseline="0" dirty="0">
+                          <a:solidFill>
+                            <a:schemeClr val="tx1"/>
+                          </a:solidFill>
+                          <a:latin typeface="+mn-lt"/>
+                          <a:ea typeface="+mn-ea"/>
+                          <a:cs typeface="+mn-cs"/>
+                        </a:rPr>
+                        <a:t>notify any problem.</a:t>
                       </a:r>
                       <a:endParaRPr lang="en-MY" sz="2000" b="1" kern="1200" baseline="0" dirty="0">
                         <a:solidFill>
@@ -4680,44 +4871,7 @@
                         </a:spcAft>
                         <a:buClrTx/>
                         <a:buSzTx/>
-                        <a:buFont typeface="Arial" panose="020B0604020202020204" pitchFamily="34" charset="0"/>
-                        <a:buChar char="•"/>
-                        <a:defRPr/>
-                      </a:pPr>
-                      <a:r>
-                        <a:rPr lang="en-MY" sz="2000" b="1" kern="1200" baseline="0" dirty="0">
-                          <a:solidFill>
-                            <a:schemeClr val="tx1"/>
-                          </a:solidFill>
-                          <a:latin typeface="+mn-lt"/>
-                          <a:ea typeface="+mn-ea"/>
-                          <a:cs typeface="+mn-cs"/>
-                        </a:rPr>
-                        <a:t>To execute the written code with Judge0 API (Application Programming Interface) and display the output. </a:t>
-                      </a:r>
-                      <a:endParaRPr lang="en-MY" sz="2000" b="1" kern="1200" baseline="0" dirty="0">
-                        <a:solidFill>
-                          <a:schemeClr val="tx1"/>
-                        </a:solidFill>
-                        <a:latin typeface="+mn-lt"/>
-                        <a:ea typeface="+mn-ea"/>
-                        <a:cs typeface="+mn-cs"/>
-                      </a:endParaRPr>
-                    </a:p>
-                    <a:p>
-                      <a:pPr marL="342900" marR="0" indent="-342900" algn="just" defTabSz="4174490" rtl="0" eaLnBrk="1" fontAlgn="auto" latinLnBrk="0" hangingPunct="1">
-                        <a:lnSpc>
-                          <a:spcPct val="110000"/>
-                        </a:lnSpc>
-                        <a:spcBef>
-                          <a:spcPts val="0"/>
-                        </a:spcBef>
-                        <a:spcAft>
-                          <a:spcPts val="0"/>
-                        </a:spcAft>
-                        <a:buClrTx/>
-                        <a:buSzTx/>
-                        <a:buFont typeface="Arial" panose="020B0604020202020204" pitchFamily="34" charset="0"/>
+                        <a:buFont typeface="Arial" panose="02080604020202020204" pitchFamily="34" charset="0"/>
                         <a:buChar char="•"/>
                         <a:defRPr/>
                       </a:pPr>
@@ -4731,43 +4885,6 @@
                           <a:cs typeface="+mn-cs"/>
                         </a:rPr>
                         <a:t>To create an audio channel of communication between instructors and learners.</a:t>
-                      </a:r>
-                      <a:endParaRPr lang="en-MY" sz="2000" b="1" kern="1200" baseline="0" dirty="0">
-                        <a:solidFill>
-                          <a:schemeClr val="tx1"/>
-                        </a:solidFill>
-                        <a:latin typeface="+mn-lt"/>
-                        <a:ea typeface="+mn-ea"/>
-                        <a:cs typeface="+mn-cs"/>
-                      </a:endParaRPr>
-                    </a:p>
-                    <a:p>
-                      <a:pPr marL="342900" marR="0" indent="-342900" algn="just" defTabSz="4174490" rtl="0" eaLnBrk="1" fontAlgn="auto" latinLnBrk="0" hangingPunct="1">
-                        <a:lnSpc>
-                          <a:spcPct val="110000"/>
-                        </a:lnSpc>
-                        <a:spcBef>
-                          <a:spcPts val="0"/>
-                        </a:spcBef>
-                        <a:spcAft>
-                          <a:spcPts val="0"/>
-                        </a:spcAft>
-                        <a:buClrTx/>
-                        <a:buSzTx/>
-                        <a:buFont typeface="Arial" panose="020B0604020202020204" pitchFamily="34" charset="0"/>
-                        <a:buChar char="•"/>
-                        <a:defRPr/>
-                      </a:pPr>
-                      <a:r>
-                        <a:rPr lang="en-MY" sz="2000" b="1" kern="1200" baseline="0" dirty="0">
-                          <a:solidFill>
-                            <a:schemeClr val="tx1"/>
-                          </a:solidFill>
-                          <a:latin typeface="+mn-lt"/>
-                          <a:ea typeface="+mn-ea"/>
-                          <a:cs typeface="+mn-cs"/>
-                        </a:rPr>
-                        <a:t>To include diverse control options like can edit and can view within the system. </a:t>
                       </a:r>
                       <a:endParaRPr lang="en-MY" sz="2000" b="1" kern="1200" baseline="0" dirty="0">
                         <a:solidFill>
@@ -6098,7 +6215,7 @@
                         </a:spcAft>
                         <a:buClrTx/>
                         <a:buSzTx/>
-                        <a:buFont typeface="Arial" panose="020B0604020202020204" pitchFamily="34" charset="0"/>
+                        <a:buFont typeface="Arial" panose="02080604020202020204" pitchFamily="34" charset="0"/>
                         <a:buChar char="•"/>
                         <a:defRPr/>
                       </a:pPr>
@@ -6131,7 +6248,7 @@
                         </a:spcAft>
                         <a:buClrTx/>
                         <a:buSzTx/>
-                        <a:buFont typeface="Arial" panose="020B0604020202020204" pitchFamily="34" charset="0"/>
+                        <a:buFont typeface="Arial" panose="02080604020202020204" pitchFamily="34" charset="0"/>
                         <a:buChar char="•"/>
                         <a:defRPr/>
                       </a:pPr>
@@ -6164,7 +6281,7 @@
                         </a:spcAft>
                         <a:buClrTx/>
                         <a:buSzTx/>
-                        <a:buFont typeface="Arial" panose="020B0604020202020204" pitchFamily="34" charset="0"/>
+                        <a:buFont typeface="Arial" panose="02080604020202020204" pitchFamily="34" charset="0"/>
                         <a:buChar char="•"/>
                         <a:defRPr/>
                       </a:pPr>
@@ -6244,7 +6361,7 @@
                         </a:spcAft>
                         <a:buClrTx/>
                         <a:buSzTx/>
-                        <a:buFont typeface="Arial" panose="020B0604020202020204" pitchFamily="34" charset="0"/>
+                        <a:buFont typeface="Arial" panose="02080604020202020204" pitchFamily="34" charset="0"/>
                         <a:buChar char="•"/>
                         <a:defRPr/>
                       </a:pPr>
@@ -6288,7 +6405,7 @@
                         </a:spcAft>
                         <a:buClrTx/>
                         <a:buSzTx/>
-                        <a:buFont typeface="Arial" panose="020B0604020202020204" pitchFamily="34" charset="0"/>
+                        <a:buFont typeface="Arial" panose="02080604020202020204" pitchFamily="34" charset="0"/>
                         <a:buNone/>
                         <a:defRPr/>
                       </a:pPr>
@@ -6971,14 +7088,14 @@
           <a:lstStyle/>
           <a:p>
             <a:r>
-              <a:rPr lang="en-US" sz="5400" dirty="0">
+              <a:rPr lang="en-US" sz="4800" dirty="0">
                 <a:solidFill>
                   <a:schemeClr val="tx1"/>
                 </a:solidFill>
               </a:rPr>
-              <a:t>Program Code: CSC 3810</a:t>
+              <a:t>Program Code: CSC 3813</a:t>
             </a:r>
-            <a:endParaRPr lang="en-US" sz="5400" dirty="0">
+            <a:endParaRPr lang="en-US" sz="4800" dirty="0">
               <a:solidFill>
                 <a:schemeClr val="tx1"/>
               </a:solidFill>

</xml_diff>